<commit_message>
Made changes on presentation mode
</commit_message>
<xml_diff>
--- a/LV for Advanced Apps - 10 Keys to Success - .pptx
+++ b/LV for Advanced Apps - 10 Keys to Success - .pptx
@@ -40222,7 +40222,7 @@
           <a:lstStyle/>
           <a:p>
             <a:r>
-              <a:rPr lang="en-US" smtClean="0"/>
+              <a:rPr lang="en-US" dirty="0" smtClean="0"/>
               <a:t>2013 </a:t>
             </a:r>
             <a:r>
@@ -41433,6 +41433,13 @@
   <p:clrMapOvr>
     <a:masterClrMapping/>
   </p:clrMapOvr>
+  <p:timing>
+    <p:tnLst>
+      <p:par>
+        <p:cTn xmlns:p14="http://schemas.microsoft.com/office/powerpoint/2010/main" id="1" dur="indefinite" restart="never" nodeType="tmRoot"/>
+      </p:par>
+    </p:tnLst>
+  </p:timing>
 </p:sld>
 </file>
 

</xml_diff>